<commit_message>
adding ppt for presentation
</commit_message>
<xml_diff>
--- a/final_project/final_project_presentation.pptx
+++ b/final_project/final_project_presentation.pptx
@@ -5,7 +5,7 @@
     <p:sldMasterId id="2147483648" r:id="rId1"/>
   </p:sldMasterIdLst>
   <p:notesMasterIdLst>
-    <p:notesMasterId r:id="rId18"/>
+    <p:notesMasterId r:id="rId17"/>
   </p:notesMasterIdLst>
   <p:sldIdLst>
     <p:sldId id="256" r:id="rId2"/>
@@ -19,11 +19,10 @@
     <p:sldId id="262" r:id="rId10"/>
     <p:sldId id="269" r:id="rId11"/>
     <p:sldId id="273" r:id="rId12"/>
-    <p:sldId id="263" r:id="rId13"/>
-    <p:sldId id="272" r:id="rId14"/>
-    <p:sldId id="264" r:id="rId15"/>
-    <p:sldId id="265" r:id="rId16"/>
-    <p:sldId id="267" r:id="rId17"/>
+    <p:sldId id="272" r:id="rId13"/>
+    <p:sldId id="264" r:id="rId14"/>
+    <p:sldId id="265" r:id="rId15"/>
+    <p:sldId id="267" r:id="rId16"/>
   </p:sldIdLst>
   <p:sldSz cx="12192000" cy="6858000"/>
   <p:notesSz cx="6858000" cy="9144000"/>
@@ -1115,125 +1114,6 @@
           <a:bodyPr/>
           <a:lstStyle/>
           <a:p>
-            <a:endParaRPr lang="en-US" dirty="0" smtClean="0"/>
-          </a:p>
-          <a:p>
-            <a:endParaRPr lang="en-US" dirty="0" smtClean="0"/>
-          </a:p>
-          <a:p>
-            <a:pPr marL="0" marR="0" indent="0" algn="l" defTabSz="914400" rtl="0" eaLnBrk="1" fontAlgn="auto" latinLnBrk="0" hangingPunct="1">
-              <a:lnSpc>
-                <a:spcPct val="100000"/>
-              </a:lnSpc>
-              <a:spcBef>
-                <a:spcPts val="0"/>
-              </a:spcBef>
-              <a:spcAft>
-                <a:spcPts val="0"/>
-              </a:spcAft>
-              <a:buClrTx/>
-              <a:buSzTx/>
-              <a:buFontTx/>
-              <a:buNone/>
-              <a:tabLst/>
-              <a:defRPr/>
-            </a:pPr>
-            <a:r>
-              <a:rPr lang="en-US" dirty="0" smtClean="0">
-                <a:hlinkClick r:id="rId3"/>
-              </a:rPr>
-              <a:t>Mean Average Precision @ 5</a:t>
-            </a:r>
-            <a:r>
-              <a:rPr lang="en-US" dirty="0" smtClean="0"/>
-              <a:t> (MAP@5):</a:t>
-            </a:r>
-          </a:p>
-          <a:p>
-            <a:endParaRPr lang="en-US" dirty="0"/>
-          </a:p>
-        </p:txBody>
-      </p:sp>
-      <p:sp>
-        <p:nvSpPr>
-          <p:cNvPr id="4" name="Slide Number Placeholder 3"/>
-          <p:cNvSpPr>
-            <a:spLocks noGrp="1"/>
-          </p:cNvSpPr>
-          <p:nvPr>
-            <p:ph type="sldNum" sz="quarter" idx="10"/>
-          </p:nvPr>
-        </p:nvSpPr>
-        <p:spPr/>
-        <p:txBody>
-          <a:bodyPr/>
-          <a:lstStyle/>
-          <a:p>
-            <a:fld id="{4C0285AE-D016-5F46-8A34-5AD9AA510167}" type="slidenum">
-              <a:rPr lang="en-US" smtClean="0"/>
-              <a:t>12</a:t>
-            </a:fld>
-            <a:endParaRPr lang="en-US"/>
-          </a:p>
-        </p:txBody>
-      </p:sp>
-    </p:spTree>
-    <p:extLst>
-      <p:ext uri="{BB962C8B-B14F-4D97-AF65-F5344CB8AC3E}">
-        <p14:creationId xmlns:p14="http://schemas.microsoft.com/office/powerpoint/2010/main" val="1204754116"/>
-      </p:ext>
-    </p:extLst>
-  </p:cSld>
-  <p:clrMapOvr>
-    <a:masterClrMapping/>
-  </p:clrMapOvr>
-</p:notes>
-</file>
-
-<file path=ppt/notesSlides/notesSlide7.xml><?xml version="1.0" encoding="utf-8"?>
-<p:notes xmlns:a="http://schemas.openxmlformats.org/drawingml/2006/main" xmlns:r="http://schemas.openxmlformats.org/officeDocument/2006/relationships" xmlns:p="http://schemas.openxmlformats.org/presentationml/2006/main">
-  <p:cSld>
-    <p:spTree>
-      <p:nvGrpSpPr>
-        <p:cNvPr id="1" name=""/>
-        <p:cNvGrpSpPr/>
-        <p:nvPr/>
-      </p:nvGrpSpPr>
-      <p:grpSpPr>
-        <a:xfrm>
-          <a:off x="0" y="0"/>
-          <a:ext cx="0" cy="0"/>
-          <a:chOff x="0" y="0"/>
-          <a:chExt cx="0" cy="0"/>
-        </a:xfrm>
-      </p:grpSpPr>
-      <p:sp>
-        <p:nvSpPr>
-          <p:cNvPr id="2" name="Slide Image Placeholder 1"/>
-          <p:cNvSpPr>
-            <a:spLocks noGrp="1" noRot="1" noChangeAspect="1"/>
-          </p:cNvSpPr>
-          <p:nvPr>
-            <p:ph type="sldImg"/>
-          </p:nvPr>
-        </p:nvSpPr>
-        <p:spPr/>
-      </p:sp>
-      <p:sp>
-        <p:nvSpPr>
-          <p:cNvPr id="3" name="Notes Placeholder 2"/>
-          <p:cNvSpPr>
-            <a:spLocks noGrp="1"/>
-          </p:cNvSpPr>
-          <p:nvPr>
-            <p:ph type="body" idx="1"/>
-          </p:nvPr>
-        </p:nvSpPr>
-        <p:spPr/>
-        <p:txBody>
-          <a:bodyPr/>
-          <a:lstStyle/>
-          <a:p>
             <a:r>
               <a:rPr lang="en-US" dirty="0" smtClean="0"/>
               <a:t>Does predict each hotel – just usually not at the correct time.</a:t>
@@ -1263,7 +1143,7 @@
           <a:p>
             <a:fld id="{4C0285AE-D016-5F46-8A34-5AD9AA510167}" type="slidenum">
               <a:rPr lang="en-US" smtClean="0"/>
-              <a:t>13</a:t>
+              <a:t>12</a:t>
             </a:fld>
             <a:endParaRPr lang="en-US"/>
           </a:p>
@@ -4456,27 +4336,13 @@
               <a:buNone/>
             </a:pPr>
             <a:r>
-              <a:rPr lang="en-US" dirty="0" smtClean="0"/>
-              <a:t>10-way </a:t>
-            </a:r>
-            <a:r>
               <a:rPr lang="en-US" dirty="0"/>
-              <a:t>Cross-Validated RMSE =  </a:t>
-            </a:r>
-            <a:r>
-              <a:rPr lang="en-US" dirty="0" smtClean="0"/>
-              <a:t>38.4</a:t>
-            </a:r>
-          </a:p>
-          <a:p>
-            <a:pPr marL="0" indent="0">
-              <a:buNone/>
-            </a:pPr>
-            <a:r>
-              <a:rPr lang="en-US" dirty="0" smtClean="0"/>
-              <a:t>Null Hypothesis RMSE = 52.6</a:t>
-            </a:r>
-            <a:endParaRPr lang="en-US" dirty="0"/>
+              <a:t>Mean Accuracy </a:t>
+            </a:r>
+            <a:r>
+              <a:rPr lang="en-US" dirty="0" smtClean="0"/>
+              <a:t>Score: 0.97</a:t>
+            </a:r>
           </a:p>
         </p:txBody>
       </p:sp>
@@ -4527,20 +4393,8 @@
           <a:lstStyle/>
           <a:p>
             <a:r>
-              <a:rPr lang="en-US" smtClean="0"/>
-              <a:t>RMSE of </a:t>
-            </a:r>
-            <a:r>
-              <a:rPr lang="en-US" dirty="0" smtClean="0"/>
-              <a:t>cycle through max </a:t>
-            </a:r>
-            <a:r>
-              <a:rPr lang="en-US" dirty="0" err="1" smtClean="0"/>
-              <a:t>dephth</a:t>
-            </a:r>
-            <a:r>
-              <a:rPr lang="en-US" dirty="0" smtClean="0"/>
-              <a:t> and min samples per leaf allowed</a:t>
+              <a:rPr lang="en-US" dirty="0" smtClean="0"/>
+              <a:t>RMSE of cycle through max depth and min samples per leaf allowed</a:t>
             </a:r>
             <a:endParaRPr lang="en-US" dirty="0"/>
           </a:p>
@@ -5705,143 +5559,6 @@
           <a:p>
             <a:r>
               <a:rPr lang="en-US" dirty="0" smtClean="0"/>
-              <a:t>Results of Model on Testing Set </a:t>
-            </a:r>
-            <a:endParaRPr lang="en-US" dirty="0"/>
-          </a:p>
-        </p:txBody>
-      </p:sp>
-      <p:sp>
-        <p:nvSpPr>
-          <p:cNvPr id="3" name="Content Placeholder 2"/>
-          <p:cNvSpPr>
-            <a:spLocks noGrp="1"/>
-          </p:cNvSpPr>
-          <p:nvPr>
-            <p:ph idx="1"/>
-          </p:nvPr>
-        </p:nvSpPr>
-        <p:spPr/>
-        <p:txBody>
-          <a:bodyPr/>
-          <a:lstStyle/>
-          <a:p>
-            <a:pPr fontAlgn="base"/>
-            <a:r>
-              <a:rPr lang="en-US" dirty="0" smtClean="0"/>
-              <a:t>Score of test v. </a:t>
-            </a:r>
-            <a:r>
-              <a:rPr lang="en-US" dirty="0" err="1" smtClean="0"/>
-              <a:t>preds</a:t>
-            </a:r>
-            <a:r>
-              <a:rPr lang="en-US" dirty="0" smtClean="0"/>
-              <a:t>: 0.97 </a:t>
-            </a:r>
-          </a:p>
-          <a:p>
-            <a:pPr fontAlgn="base"/>
-            <a:r>
-              <a:rPr lang="en-US" dirty="0" smtClean="0"/>
-              <a:t>RMSE </a:t>
-            </a:r>
-            <a:r>
-              <a:rPr lang="en-US" dirty="0"/>
-              <a:t>Final Model </a:t>
-            </a:r>
-            <a:r>
-              <a:rPr lang="en-US" dirty="0" smtClean="0"/>
-              <a:t>39.1</a:t>
-            </a:r>
-          </a:p>
-          <a:p>
-            <a:pPr fontAlgn="base"/>
-            <a:r>
-              <a:rPr lang="en-US" dirty="0" smtClean="0"/>
-              <a:t> </a:t>
-            </a:r>
-            <a:r>
-              <a:rPr lang="en-US" dirty="0"/>
-              <a:t>CV RMSE Final Model </a:t>
-            </a:r>
-            <a:r>
-              <a:rPr lang="en-US" dirty="0" smtClean="0"/>
-              <a:t>39.8</a:t>
-            </a:r>
-          </a:p>
-          <a:p>
-            <a:pPr fontAlgn="base"/>
-            <a:r>
-              <a:rPr lang="en-US" dirty="0" smtClean="0"/>
-              <a:t>Accuracy </a:t>
-            </a:r>
-            <a:r>
-              <a:rPr lang="en-US" dirty="0"/>
-              <a:t>for Test of Final Model </a:t>
-            </a:r>
-            <a:r>
-              <a:rPr lang="en-US" dirty="0" smtClean="0"/>
-              <a:t>0.13</a:t>
-            </a:r>
-            <a:endParaRPr lang="en-US" dirty="0"/>
-          </a:p>
-        </p:txBody>
-      </p:sp>
-    </p:spTree>
-    <p:extLst>
-      <p:ext uri="{BB962C8B-B14F-4D97-AF65-F5344CB8AC3E}">
-        <p14:creationId xmlns:p14="http://schemas.microsoft.com/office/powerpoint/2010/main" val="680466996"/>
-      </p:ext>
-    </p:extLst>
-  </p:cSld>
-  <p:clrMapOvr>
-    <a:masterClrMapping/>
-  </p:clrMapOvr>
-  <p:timing>
-    <p:tnLst>
-      <p:par>
-        <p:cTn id="1" dur="indefinite" restart="never" nodeType="tmRoot"/>
-      </p:par>
-    </p:tnLst>
-  </p:timing>
-</p:sld>
-</file>
-
-<file path=ppt/slides/slide13.xml><?xml version="1.0" encoding="utf-8"?>
-<p:sld xmlns:a="http://schemas.openxmlformats.org/drawingml/2006/main" xmlns:r="http://schemas.openxmlformats.org/officeDocument/2006/relationships" xmlns:p="http://schemas.openxmlformats.org/presentationml/2006/main">
-  <p:cSld>
-    <p:spTree>
-      <p:nvGrpSpPr>
-        <p:cNvPr id="1" name=""/>
-        <p:cNvGrpSpPr/>
-        <p:nvPr/>
-      </p:nvGrpSpPr>
-      <p:grpSpPr>
-        <a:xfrm>
-          <a:off x="0" y="0"/>
-          <a:ext cx="0" cy="0"/>
-          <a:chOff x="0" y="0"/>
-          <a:chExt cx="0" cy="0"/>
-        </a:xfrm>
-      </p:grpSpPr>
-      <p:sp>
-        <p:nvSpPr>
-          <p:cNvPr id="2" name="Title 1"/>
-          <p:cNvSpPr>
-            <a:spLocks noGrp="1"/>
-          </p:cNvSpPr>
-          <p:nvPr>
-            <p:ph type="title"/>
-          </p:nvPr>
-        </p:nvSpPr>
-        <p:spPr/>
-        <p:txBody>
-          <a:bodyPr/>
-          <a:lstStyle/>
-          <a:p>
-            <a:r>
-              <a:rPr lang="en-US" dirty="0" smtClean="0"/>
               <a:t>Testing Set: </a:t>
             </a:r>
             <a:r>
@@ -5901,7 +5618,7 @@
 </p:sld>
 </file>
 
-<file path=ppt/slides/slide14.xml><?xml version="1.0" encoding="utf-8"?>
+<file path=ppt/slides/slide13.xml><?xml version="1.0" encoding="utf-8"?>
 <p:sld xmlns:a="http://schemas.openxmlformats.org/drawingml/2006/main" xmlns:r="http://schemas.openxmlformats.org/officeDocument/2006/relationships" xmlns:p="http://schemas.openxmlformats.org/presentationml/2006/main">
   <p:cSld>
     <p:spTree>
@@ -5972,11 +5689,7 @@
             <a:pPr lvl="1" fontAlgn="base"/>
             <a:r>
               <a:rPr lang="en-US" dirty="0" smtClean="0"/>
-              <a:t>I used only a small subset of the data provided for this </a:t>
-            </a:r>
-            <a:r>
-              <a:rPr lang="en-US" dirty="0" smtClean="0"/>
-              <a:t>project (used </a:t>
+              <a:t>I used only a small subset of the data provided for this project (used </a:t>
             </a:r>
             <a:br>
               <a:rPr lang="en-US" dirty="0" smtClean="0"/>
@@ -6040,7 +5753,7 @@
 </p:sld>
 </file>
 
-<file path=ppt/slides/slide15.xml><?xml version="1.0" encoding="utf-8"?>
+<file path=ppt/slides/slide14.xml><?xml version="1.0" encoding="utf-8"?>
 <p:sld xmlns:a="http://schemas.openxmlformats.org/drawingml/2006/main" xmlns:r="http://schemas.openxmlformats.org/officeDocument/2006/relationships" xmlns:p="http://schemas.openxmlformats.org/presentationml/2006/main">
   <p:cSld>
     <p:spTree>
@@ -6123,7 +5836,6 @@
               <a:rPr lang="en-US" dirty="0" smtClean="0"/>
               <a:t>each models parameters to try to find a better fit. </a:t>
             </a:r>
-            <a:endParaRPr lang="en-US" dirty="0" smtClean="0"/>
           </a:p>
           <a:p>
             <a:pPr fontAlgn="base"/>
@@ -6189,7 +5901,7 @@
 </p:sld>
 </file>
 
-<file path=ppt/slides/slide16.xml><?xml version="1.0" encoding="utf-8"?>
+<file path=ppt/slides/slide15.xml><?xml version="1.0" encoding="utf-8"?>
 <p:sld xmlns:a="http://schemas.openxmlformats.org/drawingml/2006/main" xmlns:r="http://schemas.openxmlformats.org/officeDocument/2006/relationships" xmlns:p="http://schemas.openxmlformats.org/presentationml/2006/main">
   <p:cSld>
     <p:spTree>
@@ -6514,15 +6226,7 @@
             </a:pPr>
             <a:r>
               <a:rPr lang="en-US" dirty="0" smtClean="0"/>
-              <a:t>These Hotel Clusters are </a:t>
-            </a:r>
-            <a:r>
-              <a:rPr lang="en-US" dirty="0" smtClean="0"/>
-              <a:t>my target </a:t>
-            </a:r>
-            <a:r>
-              <a:rPr lang="en-US" dirty="0" smtClean="0"/>
-              <a:t>class. </a:t>
+              <a:t>These Hotel Clusters are my target class. </a:t>
             </a:r>
           </a:p>
           <a:p>
@@ -6613,15 +6317,7 @@
             </a:r>
             <a:r>
               <a:rPr lang="en-US" dirty="0" smtClean="0"/>
-              <a:t>dataset to predict answer to submit – does not contain </a:t>
-            </a:r>
-            <a:r>
-              <a:rPr lang="en-US" dirty="0" smtClean="0"/>
-              <a:t>target column</a:t>
-            </a:r>
-            <a:r>
-              <a:rPr lang="en-US" dirty="0" smtClean="0"/>
-              <a:t>.</a:t>
+              <a:t>dataset to predict answer to submit – does not contain target column.</a:t>
             </a:r>
             <a:endParaRPr lang="en-US" dirty="0"/>
           </a:p>
@@ -6956,11 +6652,7 @@
             <a:pPr lvl="1" fontAlgn="base"/>
             <a:r>
               <a:rPr lang="en-US" dirty="0" smtClean="0"/>
-              <a:t>Added </a:t>
-            </a:r>
-            <a:r>
-              <a:rPr lang="en-US" dirty="0" smtClean="0"/>
-              <a:t>features </a:t>
+              <a:t>Added features </a:t>
             </a:r>
             <a:r>
               <a:rPr lang="en-US" dirty="0"/>
@@ -6968,19 +6660,7 @@
             </a:r>
             <a:r>
               <a:rPr lang="en-US" dirty="0" smtClean="0"/>
-              <a:t>derived </a:t>
-            </a:r>
-            <a:r>
-              <a:rPr lang="en-US" dirty="0" smtClean="0"/>
-              <a:t>from </a:t>
-            </a:r>
-            <a:r>
-              <a:rPr lang="en-US" dirty="0" smtClean="0"/>
-              <a:t>other features in data </a:t>
-            </a:r>
-            <a:r>
-              <a:rPr lang="en-US" dirty="0" smtClean="0"/>
-              <a:t>such as: </a:t>
+              <a:t>derived from other features in data such as: </a:t>
             </a:r>
             <a:endParaRPr lang="en-US" dirty="0"/>
           </a:p>
@@ -6988,19 +6668,7 @@
             <a:pPr lvl="2" fontAlgn="base"/>
             <a:r>
               <a:rPr lang="en-US" dirty="0" smtClean="0"/>
-              <a:t>Length of stay, time on the site, </a:t>
-            </a:r>
-            <a:r>
-              <a:rPr lang="en-US" dirty="0" smtClean="0"/>
-              <a:t>numerical day of the week, </a:t>
-            </a:r>
-            <a:r>
-              <a:rPr lang="en-US" dirty="0" smtClean="0"/>
-              <a:t>if it is a family </a:t>
-            </a:r>
-            <a:r>
-              <a:rPr lang="en-US" dirty="0" smtClean="0"/>
-              <a:t>(adults and kids) </a:t>
+              <a:t>Length of stay, time on the site, numerical day of the week, if it is a family (adults and kids) </a:t>
             </a:r>
             <a:endParaRPr lang="en-US" dirty="0"/>
           </a:p>
@@ -7008,11 +6676,7 @@
             <a:pPr lvl="1" fontAlgn="base"/>
             <a:r>
               <a:rPr lang="en-US" dirty="0" smtClean="0"/>
-              <a:t>Reduced the training </a:t>
-            </a:r>
-            <a:r>
-              <a:rPr lang="en-US" dirty="0" smtClean="0"/>
-              <a:t>to only contain data when a user is booking a hotel</a:t>
+              <a:t>Reduced the training to only contain data when a user is booking a hotel</a:t>
             </a:r>
           </a:p>
           <a:p>
@@ -7031,11 +6695,7 @@
             <a:pPr lvl="1" fontAlgn="base"/>
             <a:r>
               <a:rPr lang="en-US" dirty="0" smtClean="0"/>
-              <a:t>Added </a:t>
-            </a:r>
-            <a:r>
-              <a:rPr lang="en-US" dirty="0" smtClean="0"/>
-              <a:t>features </a:t>
+              <a:t>Added features </a:t>
             </a:r>
             <a:r>
               <a:rPr lang="en-US" dirty="0"/>
@@ -7091,11 +6751,7 @@
             </a:r>
             <a:r>
               <a:rPr lang="en-US" dirty="0" smtClean="0"/>
-              <a:t> of the reviews</a:t>
-            </a:r>
-            <a:r>
-              <a:rPr lang="en-US" dirty="0" smtClean="0"/>
-              <a:t>.</a:t>
+              <a:t> of the reviews.</a:t>
             </a:r>
           </a:p>
           <a:p>
@@ -7208,25 +6864,32 @@
           </a:prstGeom>
         </p:spPr>
       </p:pic>
-      <p:sp>
-        <p:nvSpPr>
-          <p:cNvPr id="13" name="Content Placeholder 12"/>
-          <p:cNvSpPr>
-            <a:spLocks noGrp="1"/>
-          </p:cNvSpPr>
+      <p:pic>
+        <p:nvPicPr>
+          <p:cNvPr id="3" name="Content Placeholder 2"/>
+          <p:cNvPicPr>
+            <a:picLocks noGrp="1" noChangeAspect="1"/>
+          </p:cNvPicPr>
           <p:nvPr>
             <p:ph sz="half" idx="1"/>
           </p:nvPr>
-        </p:nvSpPr>
-        <p:spPr/>
-        <p:txBody>
-          <a:bodyPr/>
-          <a:lstStyle/>
-          <a:p>
-            <a:endParaRPr lang="en-US"/>
-          </a:p>
-        </p:txBody>
-      </p:sp>
+        </p:nvPicPr>
+        <p:blipFill>
+          <a:blip r:embed="rId3"/>
+          <a:stretch>
+            <a:fillRect/>
+          </a:stretch>
+        </p:blipFill>
+        <p:spPr>
+          <a:xfrm>
+            <a:off x="274320" y="2034356"/>
+            <a:ext cx="5745162" cy="4105325"/>
+          </a:xfrm>
+          <a:prstGeom prst="rect">
+            <a:avLst/>
+          </a:prstGeom>
+        </p:spPr>
+      </p:pic>
     </p:spTree>
     <p:extLst>
       <p:ext uri="{BB962C8B-B14F-4D97-AF65-F5344CB8AC3E}">
@@ -7304,22 +6967,13 @@
           <a:p>
             <a:r>
               <a:rPr lang="en-US" dirty="0" smtClean="0"/>
-              <a:t>Size of dataset before data prep: </a:t>
-            </a:r>
-            <a:r>
-              <a:rPr lang="en-US" dirty="0" smtClean="0"/>
-              <a:t>175,000 x 26</a:t>
-            </a:r>
-            <a:endParaRPr lang="en-US" dirty="0" smtClean="0"/>
-          </a:p>
-          <a:p>
-            <a:r>
-              <a:rPr lang="en-US" dirty="0" smtClean="0"/>
-              <a:t>14,510 </a:t>
-            </a:r>
-            <a:r>
-              <a:rPr lang="en-US" dirty="0" smtClean="0"/>
-              <a:t>entries when user booked total </a:t>
+              <a:t>Size of dataset before data prep: 175,000 x 26</a:t>
+            </a:r>
+          </a:p>
+          <a:p>
+            <a:r>
+              <a:rPr lang="en-US" dirty="0" smtClean="0"/>
+              <a:t>14,510 entries when user booked total </a:t>
             </a:r>
             <a:r>
               <a:rPr lang="en-US" dirty="0"/>
@@ -7329,47 +6983,27 @@
               <a:rPr lang="en-US" dirty="0" smtClean="0"/>
               <a:t>8.3%)</a:t>
             </a:r>
+          </a:p>
+          <a:p>
             <a:endParaRPr lang="en-US" dirty="0" smtClean="0"/>
           </a:p>
           <a:p>
-            <a:endParaRPr lang="en-US" dirty="0" smtClean="0"/>
-          </a:p>
-          <a:p>
-            <a:r>
-              <a:rPr lang="en-US" dirty="0" smtClean="0"/>
-              <a:t>Size of Training </a:t>
-            </a:r>
-            <a:r>
-              <a:rPr lang="en-US" dirty="0" smtClean="0"/>
-              <a:t>dataset </a:t>
-            </a:r>
-            <a:r>
-              <a:rPr lang="en-US" dirty="0" smtClean="0"/>
-              <a:t>14,510 x 26</a:t>
-            </a:r>
-            <a:endParaRPr lang="en-US" dirty="0" smtClean="0"/>
-          </a:p>
-          <a:p>
-            <a:r>
-              <a:rPr lang="en-US" dirty="0" smtClean="0"/>
-              <a:t>Unique Users: </a:t>
-            </a:r>
-            <a:r>
-              <a:rPr lang="en-US" dirty="0" smtClean="0"/>
-              <a:t>3994</a:t>
-            </a:r>
-            <a:endParaRPr lang="en-US" dirty="0" smtClean="0"/>
-          </a:p>
-          <a:p>
-            <a:r>
-              <a:rPr lang="en-US" dirty="0" smtClean="0"/>
-              <a:t>Mean entries per user: </a:t>
-            </a:r>
-            <a:r>
-              <a:rPr lang="en-US" dirty="0" smtClean="0"/>
-              <a:t>3.6</a:t>
-            </a:r>
-            <a:endParaRPr lang="en-US" dirty="0" smtClean="0"/>
+            <a:r>
+              <a:rPr lang="en-US" dirty="0" smtClean="0"/>
+              <a:t>Size of Training dataset 14,510 x 26</a:t>
+            </a:r>
+          </a:p>
+          <a:p>
+            <a:r>
+              <a:rPr lang="en-US" dirty="0" smtClean="0"/>
+              <a:t>Unique Users: 3994</a:t>
+            </a:r>
+          </a:p>
+          <a:p>
+            <a:r>
+              <a:rPr lang="en-US" dirty="0" smtClean="0"/>
+              <a:t>Mean entries per user: 3.6</a:t>
+            </a:r>
           </a:p>
           <a:p>
             <a:r>
@@ -7386,24 +7020,14 @@
           <a:p>
             <a:r>
               <a:rPr lang="en-US" dirty="0" smtClean="0"/>
-              <a:t>Unique Hotel Country IDs: </a:t>
-            </a:r>
-            <a:r>
-              <a:rPr lang="en-US" dirty="0" smtClean="0"/>
-              <a:t>140</a:t>
-            </a:r>
-            <a:endParaRPr lang="en-US" dirty="0" smtClean="0"/>
-          </a:p>
-          <a:p>
-            <a:r>
-              <a:rPr lang="en-US" dirty="0" smtClean="0"/>
-              <a:t>Unique Hotel Market IDs: </a:t>
-            </a:r>
-            <a:r>
-              <a:rPr lang="en-US" dirty="0" smtClean="0"/>
-              <a:t>1299</a:t>
-            </a:r>
-            <a:endParaRPr lang="en-US" dirty="0" smtClean="0"/>
+              <a:t>Unique Hotel Country IDs: 140</a:t>
+            </a:r>
+          </a:p>
+          <a:p>
+            <a:r>
+              <a:rPr lang="en-US" dirty="0" smtClean="0"/>
+              <a:t>Unique Hotel Market IDs: 1299</a:t>
+            </a:r>
           </a:p>
         </p:txBody>
       </p:sp>
@@ -7489,23 +7113,7 @@
             </a:pPr>
             <a:r>
               <a:rPr lang="en-US" dirty="0" smtClean="0"/>
-              <a:t>The </a:t>
-            </a:r>
-            <a:r>
-              <a:rPr lang="en-US" dirty="0" smtClean="0"/>
-              <a:t>target </a:t>
-            </a:r>
-            <a:r>
-              <a:rPr lang="en-US" dirty="0" smtClean="0"/>
-              <a:t>was to predict which of the 100 hotel clusters the user </a:t>
-            </a:r>
-            <a:r>
-              <a:rPr lang="en-US" dirty="0" smtClean="0"/>
-              <a:t>was </a:t>
-            </a:r>
-            <a:r>
-              <a:rPr lang="en-US" dirty="0" smtClean="0"/>
-              <a:t>booking.</a:t>
+              <a:t>The target was to predict which of the 100 hotel clusters the user was booking.</a:t>
             </a:r>
           </a:p>
           <a:p>
@@ -7552,21 +7160,10 @@
             </a:r>
           </a:p>
           <a:p>
-            <a:pPr fontAlgn="base"/>
-            <a:r>
-              <a:rPr lang="en-US" dirty="0"/>
-              <a:t>Cross Validated Root Mean Squared Error </a:t>
-            </a:r>
-            <a:r>
-              <a:rPr lang="en-US" dirty="0" smtClean="0"/>
-              <a:t>as a metric to compare </a:t>
-            </a:r>
-            <a:r>
-              <a:rPr lang="en-US" dirty="0"/>
-              <a:t>Models</a:t>
-            </a:r>
-          </a:p>
-          <a:p>
+            <a:r>
+              <a:rPr lang="en-US" dirty="0" smtClean="0"/>
+              <a:t>Accuracy Score as Comparison between models</a:t>
+            </a:r>
             <a:endParaRPr lang="en-US" dirty="0"/>
           </a:p>
         </p:txBody>
@@ -7780,7 +7377,7 @@
       </p:sp>
       <p:pic>
         <p:nvPicPr>
-          <p:cNvPr id="8" name="Picture 7"/>
+          <p:cNvPr id="9" name="Picture 8"/>
           <p:cNvPicPr>
             <a:picLocks noChangeAspect="1"/>
           </p:cNvPicPr>
@@ -7794,7 +7391,7 @@
         </p:blipFill>
         <p:spPr>
           <a:xfrm>
-            <a:off x="1993900" y="1092639"/>
+            <a:off x="1409700" y="1276350"/>
             <a:ext cx="7620000" cy="4711700"/>
           </a:xfrm>
           <a:prstGeom prst="rect">

</xml_diff>